<commit_message>
prezentation without project summary
</commit_message>
<xml_diff>
--- a/blbost-final.pptx
+++ b/blbost-final.pptx
@@ -114,6 +114,22 @@
       </a:defRPr>
     </a:lvl9pPr>
   </p:defaultTextStyle>
+  <p:extLst>
+    <p:ext uri="{EFAFB233-063F-42B5-8137-9DF3F51BA10A}">
+      <p15:sldGuideLst xmlns:p15="http://schemas.microsoft.com/office/powerpoint/2012/main">
+        <p15:guide id="1" orient="horz" pos="2160">
+          <p15:clr>
+            <a:srgbClr val="A4A3A4"/>
+          </p15:clr>
+        </p15:guide>
+        <p15:guide id="2" pos="2880">
+          <p15:clr>
+            <a:srgbClr val="A4A3A4"/>
+          </p15:clr>
+        </p15:guide>
+      </p15:sldGuideLst>
+    </p:ext>
+  </p:extLst>
 </p:presentation>
 </file>
 
@@ -3305,7 +3321,7 @@
     </p:spTree>
     <p:extLst>
       <p:ext uri="{BB962C8B-B14F-4D97-AF65-F5344CB8AC3E}">
-        <p14:creationId xmlns="" xmlns:p14="http://schemas.microsoft.com/office/powerpoint/2010/main" val="1806626"/>
+        <p14:creationId xmlns:p14="http://schemas.microsoft.com/office/powerpoint/2010/main" val="1806626"/>
       </p:ext>
     </p:extLst>
   </p:cSld>
@@ -3389,13 +3405,20 @@
     </p:spTree>
     <p:extLst>
       <p:ext uri="{BB962C8B-B14F-4D97-AF65-F5344CB8AC3E}">
-        <p14:creationId xmlns="" xmlns:p14="http://schemas.microsoft.com/office/powerpoint/2010/main" val="2969677562"/>
+        <p14:creationId xmlns:p14="http://schemas.microsoft.com/office/powerpoint/2010/main" val="2969677562"/>
       </p:ext>
     </p:extLst>
   </p:cSld>
   <p:clrMapOvr>
     <a:masterClrMapping/>
   </p:clrMapOvr>
+  <p:timing>
+    <p:tnLst>
+      <p:par>
+        <p:cTn id="1" dur="indefinite" restart="never" nodeType="tmRoot"/>
+      </p:par>
+    </p:tnLst>
+  </p:timing>
 </p:sld>
 </file>
 
@@ -3493,13 +3516,20 @@
     </p:spTree>
     <p:extLst>
       <p:ext uri="{BB962C8B-B14F-4D97-AF65-F5344CB8AC3E}">
-        <p14:creationId xmlns="" xmlns:p14="http://schemas.microsoft.com/office/powerpoint/2010/main" val="434537354"/>
+        <p14:creationId xmlns:p14="http://schemas.microsoft.com/office/powerpoint/2010/main" val="434537354"/>
       </p:ext>
     </p:extLst>
   </p:cSld>
   <p:clrMapOvr>
     <a:masterClrMapping/>
   </p:clrMapOvr>
+  <p:timing>
+    <p:tnLst>
+      <p:par>
+        <p:cTn id="1" dur="indefinite" restart="never" nodeType="tmRoot"/>
+      </p:par>
+    </p:tnLst>
+  </p:timing>
 </p:sld>
 </file>
 
@@ -3577,7 +3607,6 @@
               <a:rPr lang="cs-CZ" dirty="0" smtClean="0"/>
               <a:t>edoucí týmu, Programátor</a:t>
             </a:r>
-            <a:endParaRPr lang="cs-CZ" dirty="0" smtClean="0"/>
           </a:p>
           <a:p>
             <a:pPr marL="411480" lvl="1" indent="0">
@@ -3602,7 +3631,6 @@
               <a:rPr lang="cs-CZ" dirty="0" smtClean="0"/>
               <a:t>Programátor</a:t>
             </a:r>
-            <a:endParaRPr lang="cs-CZ" dirty="0" smtClean="0"/>
           </a:p>
           <a:p>
             <a:pPr marL="411480" lvl="1" indent="0">
@@ -3653,13 +3681,20 @@
     </p:spTree>
     <p:extLst>
       <p:ext uri="{BB962C8B-B14F-4D97-AF65-F5344CB8AC3E}">
-        <p14:creationId xmlns="" xmlns:p14="http://schemas.microsoft.com/office/powerpoint/2010/main" val="4017673017"/>
+        <p14:creationId xmlns:p14="http://schemas.microsoft.com/office/powerpoint/2010/main" val="4017673017"/>
       </p:ext>
     </p:extLst>
   </p:cSld>
   <p:clrMapOvr>
     <a:masterClrMapping/>
   </p:clrMapOvr>
+  <p:timing>
+    <p:tnLst>
+      <p:par>
+        <p:cTn id="1" dur="indefinite" restart="never" nodeType="tmRoot"/>
+      </p:par>
+    </p:tnLst>
+  </p:timing>
 </p:sld>
 </file>
 
@@ -3697,88 +3732,93 @@
           <a:p>
             <a:r>
               <a:rPr lang="cs-CZ" dirty="0" smtClean="0"/>
-              <a:t>Finální</a:t>
+              <a:t>Finální stav projektu</a:t>
+            </a:r>
+            <a:endParaRPr lang="en-US" dirty="0"/>
+          </a:p>
+        </p:txBody>
+      </p:sp>
+      <p:sp>
+        <p:nvSpPr>
+          <p:cNvPr id="3" name="Zástupný symbol pro obsah 2"/>
+          <p:cNvSpPr>
+            <a:spLocks noGrp="1"/>
+          </p:cNvSpPr>
+          <p:nvPr>
+            <p:ph idx="1"/>
+          </p:nvPr>
+        </p:nvSpPr>
+        <p:spPr/>
+        <p:txBody>
+          <a:bodyPr/>
+          <a:lstStyle/>
+          <a:p>
+            <a:r>
+              <a:rPr lang="cs-CZ" dirty="0" smtClean="0"/>
+              <a:t>Základní struktura jádra</a:t>
+            </a:r>
+          </a:p>
+          <a:p>
+            <a:r>
+              <a:rPr lang="cs-CZ" dirty="0" smtClean="0"/>
+              <a:t>Proces Shell a aktivní konzolové okno</a:t>
+            </a:r>
+          </a:p>
+          <a:p>
+            <a:pPr lvl="1"/>
+            <a:r>
+              <a:rPr lang="cs-CZ" dirty="0" smtClean="0"/>
+              <a:t>Komunikace mezi oknem a </a:t>
+            </a:r>
+            <a:r>
+              <a:rPr lang="cs-CZ" dirty="0" err="1" smtClean="0"/>
+              <a:t>Shellem</a:t>
+            </a:r>
+            <a:endParaRPr lang="cs-CZ" dirty="0" smtClean="0"/>
+          </a:p>
+          <a:p>
+            <a:pPr lvl="1"/>
+            <a:r>
+              <a:rPr lang="cs-CZ" dirty="0" smtClean="0"/>
+              <a:t>Ukládání historie příkazů</a:t>
+            </a:r>
+          </a:p>
+          <a:p>
+            <a:r>
+              <a:rPr lang="cs-CZ" dirty="0" smtClean="0"/>
+              <a:t>Řešení </a:t>
+            </a:r>
+            <a:r>
+              <a:rPr lang="cs-CZ" dirty="0" err="1" smtClean="0"/>
+              <a:t>Pipe</a:t>
+            </a:r>
+            <a:endParaRPr lang="cs-CZ" dirty="0" smtClean="0"/>
+          </a:p>
+          <a:p>
+            <a:r>
+              <a:rPr lang="cs-CZ" dirty="0" err="1" smtClean="0"/>
+              <a:t>Process</a:t>
             </a:r>
             <a:r>
               <a:rPr lang="cs-CZ" dirty="0" smtClean="0"/>
               <a:t> </a:t>
             </a:r>
             <a:r>
+              <a:rPr lang="cs-CZ" dirty="0" err="1" smtClean="0"/>
+              <a:t>manager</a:t>
+            </a:r>
+            <a:endParaRPr lang="cs-CZ" dirty="0" smtClean="0"/>
+          </a:p>
+          <a:p>
+            <a:r>
               <a:rPr lang="cs-CZ" dirty="0" smtClean="0"/>
-              <a:t>stav projektu</a:t>
-            </a:r>
-            <a:endParaRPr lang="en-US" dirty="0"/>
-          </a:p>
-        </p:txBody>
-      </p:sp>
-      <p:sp>
-        <p:nvSpPr>
-          <p:cNvPr id="3" name="Zástupný symbol pro obsah 2"/>
-          <p:cNvSpPr>
-            <a:spLocks noGrp="1"/>
-          </p:cNvSpPr>
-          <p:nvPr>
-            <p:ph idx="1"/>
-          </p:nvPr>
-        </p:nvSpPr>
-        <p:spPr/>
-        <p:txBody>
-          <a:bodyPr/>
-          <a:lstStyle/>
-          <a:p>
-            <a:r>
-              <a:rPr lang="cs-CZ" dirty="0" smtClean="0"/>
-              <a:t>Základní </a:t>
-            </a:r>
-            <a:r>
-              <a:rPr lang="cs-CZ" dirty="0" smtClean="0"/>
-              <a:t>struktura jádra</a:t>
-            </a:r>
-          </a:p>
-          <a:p>
-            <a:r>
-              <a:rPr lang="cs-CZ" dirty="0" smtClean="0"/>
-              <a:t>Proces Shell a aktivní konzolové okno</a:t>
-            </a:r>
-          </a:p>
-          <a:p>
-            <a:pPr lvl="1"/>
-            <a:r>
-              <a:rPr lang="cs-CZ" dirty="0" smtClean="0"/>
-              <a:t>Komunikace mezi oknem a </a:t>
-            </a:r>
+              <a:t>Syntaktický analyzátor</a:t>
+            </a:r>
+          </a:p>
+          <a:p>
             <a:r>
               <a:rPr lang="cs-CZ" dirty="0" err="1" smtClean="0"/>
-              <a:t>Shellem</a:t>
-            </a:r>
-            <a:endParaRPr lang="cs-CZ" dirty="0" smtClean="0"/>
-          </a:p>
-          <a:p>
-            <a:pPr lvl="1"/>
-            <a:r>
-              <a:rPr lang="cs-CZ" dirty="0" smtClean="0"/>
-              <a:t>Ukládání historie </a:t>
-            </a:r>
-            <a:r>
-              <a:rPr lang="cs-CZ" dirty="0" smtClean="0"/>
-              <a:t>příkazů</a:t>
-            </a:r>
-          </a:p>
-          <a:p>
-            <a:r>
-              <a:rPr lang="cs-CZ" dirty="0" smtClean="0"/>
-              <a:t>Řešení </a:t>
-            </a:r>
-            <a:r>
-              <a:rPr lang="cs-CZ" dirty="0" err="1" smtClean="0"/>
-              <a:t>Pipe</a:t>
-            </a:r>
-            <a:endParaRPr lang="cs-CZ" dirty="0" smtClean="0"/>
-          </a:p>
-          <a:p>
-            <a:r>
-              <a:rPr lang="cs-CZ" dirty="0" err="1" smtClean="0"/>
-              <a:t>Process</a:t>
+              <a:t>File</a:t>
             </a:r>
             <a:r>
               <a:rPr lang="cs-CZ" dirty="0" smtClean="0"/>
@@ -3793,52 +3833,24 @@
           <a:p>
             <a:r>
               <a:rPr lang="cs-CZ" dirty="0" smtClean="0"/>
-              <a:t>Syntaktický analyzátor</a:t>
-            </a:r>
-            <a:endParaRPr lang="cs-CZ" dirty="0" smtClean="0"/>
-          </a:p>
-          <a:p>
-            <a:r>
-              <a:rPr lang="cs-CZ" dirty="0" err="1" smtClean="0"/>
-              <a:t>File</a:t>
-            </a:r>
-            <a:r>
-              <a:rPr lang="cs-CZ" dirty="0" smtClean="0"/>
-              <a:t> </a:t>
-            </a:r>
-            <a:r>
-              <a:rPr lang="cs-CZ" dirty="0" err="1" smtClean="0"/>
-              <a:t>manager</a:t>
-            </a:r>
-            <a:endParaRPr lang="cs-CZ" dirty="0" smtClean="0"/>
-          </a:p>
-          <a:p>
-            <a:r>
-              <a:rPr lang="cs-CZ" dirty="0" smtClean="0"/>
-              <a:t>Spustitelné procesy</a:t>
-            </a:r>
-            <a:endParaRPr lang="cs-CZ" dirty="0" smtClean="0"/>
-          </a:p>
-          <a:p>
-            <a:pPr lvl="1"/>
+              <a:t>Spustitelné </a:t>
+            </a:r>
             <a:r>
               <a:rPr lang="cs-CZ" dirty="0" smtClean="0"/>
               <a:t>procesy</a:t>
             </a:r>
+            <a:endParaRPr lang="cs-CZ" dirty="0" smtClean="0"/>
           </a:p>
           <a:p>
             <a:r>
               <a:rPr lang="cs-CZ" dirty="0" smtClean="0"/>
-              <a:t>Zabudované procesy</a:t>
-            </a:r>
-          </a:p>
-          <a:p>
-            <a:pPr lvl="1"/>
+              <a:t>Zabudované </a:t>
+            </a:r>
             <a:r>
               <a:rPr lang="cs-CZ" dirty="0" smtClean="0"/>
               <a:t>procesy</a:t>
             </a:r>
-            <a:endParaRPr lang="en-US" dirty="0"/>
+            <a:endParaRPr lang="cs-CZ" dirty="0" smtClean="0"/>
           </a:p>
         </p:txBody>
       </p:sp>
@@ -3869,13 +3881,20 @@
     </p:spTree>
     <p:extLst>
       <p:ext uri="{BB962C8B-B14F-4D97-AF65-F5344CB8AC3E}">
-        <p14:creationId xmlns="" xmlns:p14="http://schemas.microsoft.com/office/powerpoint/2010/main" val="1120667201"/>
+        <p14:creationId xmlns:p14="http://schemas.microsoft.com/office/powerpoint/2010/main" val="1120667201"/>
       </p:ext>
     </p:extLst>
   </p:cSld>
   <p:clrMapOvr>
     <a:masterClrMapping/>
   </p:clrMapOvr>
+  <p:timing>
+    <p:tnLst>
+      <p:par>
+        <p:cTn id="1" dur="indefinite" restart="never" nodeType="tmRoot"/>
+      </p:par>
+    </p:tnLst>
+  </p:timing>
 </p:sld>
 </file>
 
@@ -3919,21 +3938,45 @@
           </a:p>
         </p:txBody>
       </p:sp>
+      <p:sp>
+        <p:nvSpPr>
+          <p:cNvPr id="4" name="Zástupný symbol pro číslo snímku 3"/>
+          <p:cNvSpPr>
+            <a:spLocks noGrp="1"/>
+          </p:cNvSpPr>
+          <p:nvPr>
+            <p:ph type="sldNum" sz="quarter" idx="12"/>
+          </p:nvPr>
+        </p:nvSpPr>
+        <p:spPr/>
+        <p:txBody>
+          <a:bodyPr/>
+          <a:lstStyle/>
+          <a:p>
+            <a:fld id="{6E2D2B3B-882E-40F3-A32F-6DD516915044}" type="slidenum">
+              <a:rPr lang="en-US" smtClean="0"/>
+              <a:pPr/>
+              <a:t>4</a:t>
+            </a:fld>
+            <a:endParaRPr lang="en-US"/>
+          </a:p>
+        </p:txBody>
+      </p:sp>
       <p:pic>
         <p:nvPicPr>
-          <p:cNvPr id="5" name="Zástupný symbol pro obsah 4"/>
+          <p:cNvPr id="7" name="picture"/>
           <p:cNvPicPr>
-            <a:picLocks noGrp="1" noChangeAspect="1"/>
+            <a:picLocks noGrp="1"/>
           </p:cNvPicPr>
           <p:nvPr>
             <p:ph idx="1"/>
           </p:nvPr>
         </p:nvPicPr>
         <p:blipFill>
-          <a:blip r:embed="rId2" cstate="print">
+          <a:blip r:embed="rId2">
             <a:extLst>
               <a:ext uri="{28A0092B-C50C-407E-A947-70E740481C1C}">
-                <a14:useLocalDpi xmlns="" xmlns:a14="http://schemas.microsoft.com/office/drawing/2010/main" val="0"/>
+                <a14:useLocalDpi xmlns:a14="http://schemas.microsoft.com/office/drawing/2010/main" val="0"/>
               </a:ext>
             </a:extLst>
           </a:blip>
@@ -3943,39 +3986,18 @@
         </p:blipFill>
         <p:spPr>
           <a:xfrm>
-            <a:off x="564662" y="1412776"/>
-            <a:ext cx="7315110" cy="5112568"/>
+            <a:off x="457200" y="1556792"/>
+            <a:ext cx="7620000" cy="4824536"/>
           </a:xfrm>
+          <a:prstGeom prst="rect">
+            <a:avLst/>
+          </a:prstGeom>
         </p:spPr>
       </p:pic>
-      <p:sp>
-        <p:nvSpPr>
-          <p:cNvPr id="4" name="Zástupný symbol pro číslo snímku 3"/>
-          <p:cNvSpPr>
-            <a:spLocks noGrp="1"/>
-          </p:cNvSpPr>
-          <p:nvPr>
-            <p:ph type="sldNum" sz="quarter" idx="12"/>
-          </p:nvPr>
-        </p:nvSpPr>
-        <p:spPr/>
-        <p:txBody>
-          <a:bodyPr/>
-          <a:lstStyle/>
-          <a:p>
-            <a:fld id="{6E2D2B3B-882E-40F3-A32F-6DD516915044}" type="slidenum">
-              <a:rPr lang="en-US" smtClean="0"/>
-              <a:pPr/>
-              <a:t>4</a:t>
-            </a:fld>
-            <a:endParaRPr lang="en-US"/>
-          </a:p>
-        </p:txBody>
-      </p:sp>
     </p:spTree>
     <p:extLst>
       <p:ext uri="{BB962C8B-B14F-4D97-AF65-F5344CB8AC3E}">
-        <p14:creationId xmlns="" xmlns:p14="http://schemas.microsoft.com/office/powerpoint/2010/main" val="1621738017"/>
+        <p14:creationId xmlns:p14="http://schemas.microsoft.com/office/powerpoint/2010/main" val="1621738017"/>
       </p:ext>
     </p:extLst>
   </p:cSld>
@@ -4038,25 +4060,6 @@
       </p:sp>
       <p:sp>
         <p:nvSpPr>
-          <p:cNvPr id="3" name="Zástupný symbol pro obsah 2"/>
-          <p:cNvSpPr>
-            <a:spLocks noGrp="1"/>
-          </p:cNvSpPr>
-          <p:nvPr>
-            <p:ph idx="1"/>
-          </p:nvPr>
-        </p:nvSpPr>
-        <p:spPr/>
-        <p:txBody>
-          <a:bodyPr/>
-          <a:lstStyle/>
-          <a:p>
-            <a:endParaRPr lang="cs-CZ"/>
-          </a:p>
-        </p:txBody>
-      </p:sp>
-      <p:sp>
-        <p:nvSpPr>
           <p:cNvPr id="4" name="Zástupný symbol pro číslo snímku 3"/>
           <p:cNvSpPr>
             <a:spLocks noGrp="1"/>
@@ -4079,11 +4082,138 @@
           </a:p>
         </p:txBody>
       </p:sp>
+      <p:pic>
+        <p:nvPicPr>
+          <p:cNvPr id="5" name="picture"/>
+          <p:cNvPicPr>
+            <a:picLocks noGrp="1"/>
+          </p:cNvPicPr>
+          <p:nvPr>
+            <p:ph idx="1"/>
+          </p:nvPr>
+        </p:nvPicPr>
+        <p:blipFill>
+          <a:blip r:embed="rId2">
+            <a:extLst>
+              <a:ext uri="{28A0092B-C50C-407E-A947-70E740481C1C}">
+                <a14:useLocalDpi xmlns:a14="http://schemas.microsoft.com/office/drawing/2010/main" val="0"/>
+              </a:ext>
+            </a:extLst>
+          </a:blip>
+          <a:stretch>
+            <a:fillRect/>
+          </a:stretch>
+        </p:blipFill>
+        <p:spPr>
+          <a:xfrm>
+            <a:off x="810816" y="1760528"/>
+            <a:ext cx="6912767" cy="3888432"/>
+          </a:xfrm>
+          <a:prstGeom prst="rect">
+            <a:avLst/>
+          </a:prstGeom>
+        </p:spPr>
+      </p:pic>
+      <p:sp>
+        <p:nvSpPr>
+          <p:cNvPr id="6" name="Obdélník 5"/>
+          <p:cNvSpPr/>
+          <p:nvPr/>
+        </p:nvSpPr>
+        <p:spPr>
+          <a:xfrm>
+            <a:off x="3491880" y="4077072"/>
+            <a:ext cx="216024" cy="216024"/>
+          </a:xfrm>
+          <a:prstGeom prst="rect">
+            <a:avLst/>
+          </a:prstGeom>
+          <a:solidFill>
+            <a:schemeClr val="bg1"/>
+          </a:solidFill>
+          <a:ln>
+            <a:noFill/>
+          </a:ln>
+        </p:spPr>
+        <p:style>
+          <a:lnRef idx="2">
+            <a:schemeClr val="accent6"/>
+          </a:lnRef>
+          <a:fillRef idx="1">
+            <a:schemeClr val="lt1"/>
+          </a:fillRef>
+          <a:effectRef idx="0">
+            <a:schemeClr val="accent6"/>
+          </a:effectRef>
+          <a:fontRef idx="minor">
+            <a:schemeClr val="dk1"/>
+          </a:fontRef>
+        </p:style>
+        <p:txBody>
+          <a:bodyPr rtlCol="0" anchor="ctr"/>
+          <a:lstStyle/>
+          <a:p>
+            <a:pPr algn="ctr"/>
+            <a:endParaRPr lang="cs-CZ"/>
+          </a:p>
+        </p:txBody>
+      </p:sp>
+      <p:sp>
+        <p:nvSpPr>
+          <p:cNvPr id="7" name="Obdélník 6"/>
+          <p:cNvSpPr/>
+          <p:nvPr/>
+        </p:nvSpPr>
+        <p:spPr>
+          <a:xfrm>
+            <a:off x="5292080" y="4077072"/>
+            <a:ext cx="216024" cy="216024"/>
+          </a:xfrm>
+          <a:prstGeom prst="rect">
+            <a:avLst/>
+          </a:prstGeom>
+          <a:solidFill>
+            <a:schemeClr val="bg1"/>
+          </a:solidFill>
+          <a:ln>
+            <a:noFill/>
+          </a:ln>
+        </p:spPr>
+        <p:style>
+          <a:lnRef idx="2">
+            <a:schemeClr val="accent6"/>
+          </a:lnRef>
+          <a:fillRef idx="1">
+            <a:schemeClr val="lt1"/>
+          </a:fillRef>
+          <a:effectRef idx="0">
+            <a:schemeClr val="accent6"/>
+          </a:effectRef>
+          <a:fontRef idx="minor">
+            <a:schemeClr val="dk1"/>
+          </a:fontRef>
+        </p:style>
+        <p:txBody>
+          <a:bodyPr rtlCol="0" anchor="ctr"/>
+          <a:lstStyle/>
+          <a:p>
+            <a:pPr algn="ctr"/>
+            <a:endParaRPr lang="cs-CZ"/>
+          </a:p>
+        </p:txBody>
+      </p:sp>
     </p:spTree>
   </p:cSld>
   <p:clrMapOvr>
     <a:masterClrMapping/>
   </p:clrMapOvr>
+  <p:timing>
+    <p:tnLst>
+      <p:par>
+        <p:cTn id="1" dur="indefinite" restart="never" nodeType="tmRoot"/>
+      </p:par>
+    </p:tnLst>
+  </p:timing>
 </p:sld>
 </file>
 
@@ -4142,165 +4272,113 @@
           <a:bodyPr/>
           <a:lstStyle/>
           <a:p>
-            <a:r>
-              <a:rPr lang="cs-CZ" b="1" dirty="0" smtClean="0"/>
-              <a:t>Řádek = Příkaz </a:t>
-            </a:r>
-            <a:r>
-              <a:rPr lang="cs-CZ" b="1" dirty="0" smtClean="0"/>
-              <a:t>{ </a:t>
-            </a:r>
-            <a:r>
-              <a:rPr lang="cs-CZ" b="1" dirty="0" smtClean="0"/>
-              <a:t>´|´ Příkaz } </a:t>
-            </a:r>
-            <a:r>
-              <a:rPr lang="cs-CZ" b="1" dirty="0" smtClean="0"/>
-              <a:t>Vstup Výstup </a:t>
-            </a:r>
-            <a:r>
-              <a:rPr lang="cs-CZ" b="1" dirty="0" smtClean="0"/>
-              <a:t>´EOL´</a:t>
-            </a:r>
-            <a:endParaRPr lang="en-US" b="1" dirty="0"/>
-          </a:p>
-          <a:p>
-            <a:endParaRPr lang="cs-CZ" b="1" dirty="0" smtClean="0"/>
-          </a:p>
-          <a:p>
-            <a:r>
-              <a:rPr lang="cs-CZ" b="1" dirty="0" smtClean="0"/>
-              <a:t>Příkaz</a:t>
-            </a:r>
-            <a:r>
-              <a:rPr lang="en-US" b="1" dirty="0" smtClean="0"/>
-              <a:t> = J</a:t>
-            </a:r>
-            <a:r>
-              <a:rPr lang="cs-CZ" b="1" dirty="0" err="1" smtClean="0"/>
-              <a:t>méno</a:t>
-            </a:r>
-            <a:r>
-              <a:rPr lang="cs-CZ" b="1" dirty="0" smtClean="0"/>
-              <a:t> </a:t>
-            </a:r>
-            <a:r>
-              <a:rPr lang="en-US" b="1" dirty="0" smtClean="0"/>
-              <a:t>{</a:t>
-            </a:r>
-            <a:r>
-              <a:rPr lang="cs-CZ" b="1" dirty="0" smtClean="0"/>
-              <a:t>Parametr</a:t>
-            </a:r>
-            <a:r>
-              <a:rPr lang="en-US" b="1" dirty="0" smtClean="0"/>
-              <a:t>}</a:t>
-            </a:r>
-            <a:r>
-              <a:rPr lang="cs-CZ" b="1" dirty="0" smtClean="0"/>
-              <a:t>  {Argument}</a:t>
-            </a:r>
-            <a:endParaRPr lang="en-US" b="1" dirty="0"/>
-          </a:p>
-          <a:p>
-            <a:r>
-              <a:rPr lang="cs-CZ" b="1" dirty="0" smtClean="0"/>
-              <a:t>Jméno</a:t>
-            </a:r>
-            <a:r>
-              <a:rPr lang="en-US" b="1" dirty="0" smtClean="0"/>
-              <a:t> = </a:t>
-            </a:r>
-            <a:r>
-              <a:rPr lang="cs-CZ" b="1" dirty="0" smtClean="0"/>
+            <a:pPr marL="114300" indent="0">
+              <a:buNone/>
+            </a:pPr>
+            <a:r>
+              <a:rPr lang="cs-CZ" dirty="0"/>
+              <a:t>Řádek = Příkaz { '|' Příkaz } Vstup </a:t>
+            </a:r>
+            <a:r>
+              <a:rPr lang="cs-CZ" dirty="0" smtClean="0"/>
+              <a:t>Výstup</a:t>
+            </a:r>
+          </a:p>
+          <a:p>
+            <a:pPr marL="114300" indent="0">
+              <a:buNone/>
+            </a:pPr>
+            <a:r>
+              <a:rPr lang="cs-CZ" dirty="0"/>
+              <a:t/>
+            </a:r>
+            <a:br>
+              <a:rPr lang="cs-CZ" dirty="0"/>
+            </a:br>
+            <a:r>
+              <a:rPr lang="cs-CZ" dirty="0"/>
+              <a:t>Příkaz = Jméno {Parametr}</a:t>
+            </a:r>
+            <a:br>
+              <a:rPr lang="cs-CZ" dirty="0"/>
+            </a:br>
+            <a:r>
+              <a:rPr lang="cs-CZ" dirty="0"/>
+              <a:t>Jméno = řetězec</a:t>
+            </a:r>
+            <a:br>
+              <a:rPr lang="cs-CZ" dirty="0"/>
+            </a:br>
+            <a:endParaRPr lang="cs-CZ" dirty="0" smtClean="0"/>
+          </a:p>
+          <a:p>
+            <a:pPr marL="114300" indent="0">
+              <a:buNone/>
+            </a:pPr>
+            <a:r>
+              <a:rPr lang="cs-CZ" dirty="0" smtClean="0"/>
+              <a:t>Parametr </a:t>
+            </a:r>
+            <a:r>
+              <a:rPr lang="cs-CZ" dirty="0"/>
+              <a:t>= </a:t>
+            </a:r>
+            <a:r>
+              <a:rPr lang="cs-CZ" dirty="0" smtClean="0"/>
               <a:t>řetězec</a:t>
             </a:r>
-            <a:endParaRPr lang="en-US" b="1" dirty="0"/>
-          </a:p>
-          <a:p>
-            <a:r>
-              <a:rPr lang="en-US" b="1" dirty="0" smtClean="0"/>
-              <a:t>P</a:t>
-            </a:r>
-            <a:r>
-              <a:rPr lang="cs-CZ" b="1" dirty="0" err="1" smtClean="0"/>
-              <a:t>arametr</a:t>
-            </a:r>
-            <a:r>
-              <a:rPr lang="en-US" b="1" dirty="0" smtClean="0"/>
-              <a:t> = ´-´</a:t>
-            </a:r>
-            <a:r>
-              <a:rPr lang="en-US" b="1" dirty="0" err="1" smtClean="0"/>
-              <a:t>písmeno</a:t>
-            </a:r>
-            <a:endParaRPr lang="en-US" b="1" dirty="0"/>
-          </a:p>
-          <a:p>
-            <a:r>
-              <a:rPr lang="cs-CZ" b="1" dirty="0" smtClean="0"/>
-              <a:t>Argument = řetězec</a:t>
-            </a:r>
-          </a:p>
-          <a:p>
-            <a:endParaRPr lang="cs-CZ" b="1" dirty="0" smtClean="0"/>
-          </a:p>
-          <a:p>
-            <a:r>
-              <a:rPr lang="en-US" b="1" dirty="0" smtClean="0"/>
-              <a:t>V</a:t>
-            </a:r>
-            <a:r>
-              <a:rPr lang="cs-CZ" b="1" dirty="0" smtClean="0"/>
-              <a:t>stup </a:t>
-            </a:r>
-            <a:r>
-              <a:rPr lang="en-US" b="1" dirty="0" smtClean="0"/>
+          </a:p>
+          <a:p>
+            <a:pPr marL="114300" indent="0">
+              <a:buNone/>
+            </a:pPr>
+            <a:endParaRPr lang="cs-CZ" dirty="0"/>
+          </a:p>
+          <a:p>
+            <a:pPr marL="114300" indent="0">
+              <a:buNone/>
+            </a:pPr>
+            <a:r>
+              <a:rPr lang="cs-CZ" dirty="0" smtClean="0"/>
+              <a:t>Vstup </a:t>
+            </a:r>
+            <a:r>
+              <a:rPr lang="cs-CZ" dirty="0"/>
               <a:t>= </a:t>
             </a:r>
             <a:r>
-              <a:rPr lang="en-US" b="1" dirty="0"/>
-              <a:t>null |´&lt;´</a:t>
-            </a:r>
-            <a:r>
-              <a:rPr lang="en-US" b="1" dirty="0" smtClean="0"/>
-              <a:t>J</a:t>
-            </a:r>
-            <a:r>
-              <a:rPr lang="cs-CZ" b="1" dirty="0" err="1" smtClean="0"/>
-              <a:t>méno</a:t>
-            </a:r>
-            <a:endParaRPr lang="en-US" b="1" dirty="0"/>
-          </a:p>
-          <a:p>
-            <a:endParaRPr lang="cs-CZ" b="1" dirty="0" smtClean="0"/>
-          </a:p>
-          <a:p>
-            <a:r>
-              <a:rPr lang="en-US" b="1" dirty="0" smtClean="0"/>
-              <a:t>V</a:t>
-            </a:r>
-            <a:r>
-              <a:rPr lang="cs-CZ" b="1" dirty="0" err="1" smtClean="0"/>
-              <a:t>ýstup</a:t>
-            </a:r>
-            <a:r>
-              <a:rPr lang="en-US" b="1" dirty="0" smtClean="0"/>
-              <a:t> = </a:t>
-            </a:r>
-            <a:r>
-              <a:rPr lang="en-US" b="1" dirty="0"/>
-              <a:t>null |´&gt;´</a:t>
-            </a:r>
-            <a:r>
-              <a:rPr lang="en-US" b="1" dirty="0" smtClean="0"/>
-              <a:t>J</a:t>
-            </a:r>
-            <a:r>
-              <a:rPr lang="cs-CZ" b="1" dirty="0" err="1" smtClean="0"/>
-              <a:t>méno</a:t>
-            </a:r>
-            <a:endParaRPr lang="en-US" b="1" dirty="0"/>
+              <a:rPr lang="cs-CZ" dirty="0" err="1"/>
+              <a:t>null</a:t>
+            </a:r>
+            <a:r>
+              <a:rPr lang="cs-CZ" dirty="0"/>
+              <a:t> | '&lt; ' Jméno</a:t>
+            </a:r>
+            <a:br>
+              <a:rPr lang="cs-CZ" dirty="0"/>
+            </a:br>
+            <a:endParaRPr lang="cs-CZ" dirty="0" smtClean="0"/>
+          </a:p>
+          <a:p>
+            <a:pPr marL="114300" indent="0">
+              <a:buNone/>
+            </a:pPr>
+            <a:r>
+              <a:rPr lang="cs-CZ" dirty="0" smtClean="0"/>
+              <a:t>Výstup </a:t>
+            </a:r>
+            <a:r>
+              <a:rPr lang="cs-CZ" dirty="0"/>
+              <a:t>= </a:t>
+            </a:r>
+            <a:r>
+              <a:rPr lang="cs-CZ" dirty="0" err="1"/>
+              <a:t>null</a:t>
+            </a:r>
+            <a:r>
+              <a:rPr lang="cs-CZ" dirty="0"/>
+              <a:t> | ' &gt; ' Jméno</a:t>
+            </a:r>
           </a:p>
         </p:txBody>
       </p:sp>
@@ -4331,13 +4409,20 @@
     </p:spTree>
     <p:extLst>
       <p:ext uri="{BB962C8B-B14F-4D97-AF65-F5344CB8AC3E}">
-        <p14:creationId xmlns="" xmlns:p14="http://schemas.microsoft.com/office/powerpoint/2010/main" val="2743438649"/>
+        <p14:creationId xmlns:p14="http://schemas.microsoft.com/office/powerpoint/2010/main" val="2743438649"/>
       </p:ext>
     </p:extLst>
   </p:cSld>
   <p:clrMapOvr>
     <a:masterClrMapping/>
   </p:clrMapOvr>
+  <p:timing>
+    <p:tnLst>
+      <p:par>
+        <p:cTn id="1" dur="indefinite" restart="never" nodeType="tmRoot"/>
+      </p:par>
+    </p:tnLst>
+  </p:timing>
 </p:sld>
 </file>
 
@@ -4396,7 +4481,70 @@
           <a:bodyPr/>
           <a:lstStyle/>
           <a:p>
-            <a:endParaRPr lang="cs-CZ"/>
+            <a:r>
+              <a:rPr lang="cs-CZ" dirty="0" err="1" smtClean="0"/>
+              <a:t>Cat</a:t>
+            </a:r>
+            <a:endParaRPr lang="cs-CZ" dirty="0" smtClean="0"/>
+          </a:p>
+          <a:p>
+            <a:r>
+              <a:rPr lang="cs-CZ" dirty="0" smtClean="0"/>
+              <a:t>Grep</a:t>
+            </a:r>
+          </a:p>
+          <a:p>
+            <a:r>
+              <a:rPr lang="cs-CZ" dirty="0" err="1" smtClean="0"/>
+              <a:t>Kill</a:t>
+            </a:r>
+            <a:endParaRPr lang="cs-CZ" dirty="0" smtClean="0"/>
+          </a:p>
+          <a:p>
+            <a:r>
+              <a:rPr lang="cs-CZ" dirty="0" err="1" smtClean="0"/>
+              <a:t>Ls</a:t>
+            </a:r>
+            <a:endParaRPr lang="cs-CZ" dirty="0" smtClean="0"/>
+          </a:p>
+          <a:p>
+            <a:r>
+              <a:rPr lang="cs-CZ" dirty="0" smtClean="0"/>
+              <a:t>Man</a:t>
+            </a:r>
+          </a:p>
+          <a:p>
+            <a:r>
+              <a:rPr lang="cs-CZ" dirty="0" err="1" smtClean="0"/>
+              <a:t>Ps</a:t>
+            </a:r>
+            <a:endParaRPr lang="cs-CZ" dirty="0" smtClean="0"/>
+          </a:p>
+          <a:p>
+            <a:r>
+              <a:rPr lang="cs-CZ" dirty="0" smtClean="0"/>
+              <a:t>Shell</a:t>
+            </a:r>
+          </a:p>
+          <a:p>
+            <a:r>
+              <a:rPr lang="cs-CZ" dirty="0" err="1" smtClean="0"/>
+              <a:t>Shutdown</a:t>
+            </a:r>
+            <a:endParaRPr lang="cs-CZ" dirty="0" smtClean="0"/>
+          </a:p>
+          <a:p>
+            <a:r>
+              <a:rPr lang="cs-CZ" dirty="0" smtClean="0"/>
+              <a:t>Sort</a:t>
+            </a:r>
+          </a:p>
+          <a:p>
+            <a:r>
+              <a:rPr lang="cs-CZ" dirty="0" err="1" smtClean="0"/>
+              <a:t>Wc</a:t>
+            </a:r>
+            <a:endParaRPr lang="cs-CZ" dirty="0"/>
           </a:p>
         </p:txBody>
       </p:sp>
@@ -4429,6 +4577,13 @@
   <p:clrMapOvr>
     <a:masterClrMapping/>
   </p:clrMapOvr>
+  <p:timing>
+    <p:tnLst>
+      <p:par>
+        <p:cTn id="1" dur="indefinite" restart="never" nodeType="tmRoot"/>
+      </p:par>
+    </p:tnLst>
+  </p:timing>
 </p:sld>
 </file>
 
@@ -4487,7 +4642,32 @@
           <a:bodyPr/>
           <a:lstStyle/>
           <a:p>
-            <a:endParaRPr lang="cs-CZ"/>
+            <a:r>
+              <a:rPr lang="cs-CZ" dirty="0" smtClean="0"/>
+              <a:t>Cd</a:t>
+            </a:r>
+          </a:p>
+          <a:p>
+            <a:r>
+              <a:rPr lang="cs-CZ" dirty="0" err="1" smtClean="0"/>
+              <a:t>Pwd</a:t>
+            </a:r>
+            <a:endParaRPr lang="cs-CZ" dirty="0" smtClean="0"/>
+          </a:p>
+          <a:p>
+            <a:r>
+              <a:rPr lang="cs-CZ" dirty="0" smtClean="0"/>
+              <a:t>Exit</a:t>
+            </a:r>
+          </a:p>
+          <a:p>
+            <a:r>
+              <a:rPr lang="cs-CZ" dirty="0" smtClean="0"/>
+              <a:t>Echo</a:t>
+            </a:r>
+          </a:p>
+          <a:p>
+            <a:endParaRPr lang="cs-CZ" dirty="0"/>
           </a:p>
         </p:txBody>
       </p:sp>
@@ -4520,6 +4700,13 @@
   <p:clrMapOvr>
     <a:masterClrMapping/>
   </p:clrMapOvr>
+  <p:timing>
+    <p:tnLst>
+      <p:par>
+        <p:cTn id="1" dur="indefinite" restart="never" nodeType="tmRoot"/>
+      </p:par>
+    </p:tnLst>
+  </p:timing>
 </p:sld>
 </file>
 
@@ -4578,7 +4765,7 @@
           <a:bodyPr/>
           <a:lstStyle/>
           <a:p>
-            <a:endParaRPr lang="cs-CZ"/>
+            <a:endParaRPr lang="cs-CZ" dirty="0"/>
           </a:p>
         </p:txBody>
       </p:sp>
@@ -4611,6 +4798,13 @@
   <p:clrMapOvr>
     <a:masterClrMapping/>
   </p:clrMapOvr>
+  <p:timing>
+    <p:tnLst>
+      <p:par>
+        <p:cTn id="1" dur="indefinite" restart="never" nodeType="tmRoot"/>
+      </p:par>
+    </p:tnLst>
+  </p:timing>
 </p:sld>
 </file>
 

</xml_diff>

<commit_message>
Presentation update. Selfreflection slide added.
</commit_message>
<xml_diff>
--- a/blbost-final.pptx
+++ b/blbost-final.pptx
@@ -3833,24 +3833,14 @@
           <a:p>
             <a:r>
               <a:rPr lang="cs-CZ" dirty="0" smtClean="0"/>
-              <a:t>Spustitelné </a:t>
-            </a:r>
+              <a:t>Spustitelné procesy</a:t>
+            </a:r>
+          </a:p>
+          <a:p>
             <a:r>
               <a:rPr lang="cs-CZ" dirty="0" smtClean="0"/>
-              <a:t>procesy</a:t>
-            </a:r>
-            <a:endParaRPr lang="cs-CZ" dirty="0" smtClean="0"/>
-          </a:p>
-          <a:p>
-            <a:r>
-              <a:rPr lang="cs-CZ" dirty="0" smtClean="0"/>
-              <a:t>Zabudované </a:t>
-            </a:r>
-            <a:r>
-              <a:rPr lang="cs-CZ" dirty="0" smtClean="0"/>
-              <a:t>procesy</a:t>
-            </a:r>
-            <a:endParaRPr lang="cs-CZ" dirty="0" smtClean="0"/>
+              <a:t>Zabudované procesy</a:t>
+            </a:r>
           </a:p>
         </p:txBody>
       </p:sp>
@@ -4765,6 +4755,32 @@
           <a:bodyPr/>
           <a:lstStyle/>
           <a:p>
+            <a:r>
+              <a:rPr lang="cs-CZ" dirty="0" smtClean="0"/>
+              <a:t>splnění zadání</a:t>
+            </a:r>
+          </a:p>
+          <a:p>
+            <a:r>
+              <a:rPr lang="cs-CZ" dirty="0" smtClean="0"/>
+              <a:t>funkční a rozšiřitelný model OS</a:t>
+            </a:r>
+          </a:p>
+          <a:p>
+            <a:endParaRPr lang="cs-CZ" dirty="0"/>
+          </a:p>
+          <a:p>
+            <a:r>
+              <a:rPr lang="cs-CZ" dirty="0" smtClean="0"/>
+              <a:t>Možná vylepšení</a:t>
+            </a:r>
+          </a:p>
+          <a:p>
+            <a:pPr lvl="1"/>
+            <a:r>
+              <a:rPr lang="cs-CZ" dirty="0" smtClean="0"/>
+              <a:t>propracovanější napojení na systém souborů hosta</a:t>
+            </a:r>
             <a:endParaRPr lang="cs-CZ" dirty="0"/>
           </a:p>
         </p:txBody>

</xml_diff>